<commit_message>
Minor fixes in the slides. Finalize minimal README.md front page
</commit_message>
<xml_diff>
--- a/Training slides (layout may be broken).pptx
+++ b/Training slides (layout may be broken).pptx
@@ -3673,7 +3673,7 @@
           </a:bodyPr>
           <a:p>
             <a:pPr algn="r"/>
-            <a:fld id="{C9E2CDAB-9208-4F2B-9189-AE1154D654E0}" type="slidenum">
+            <a:fld id="{672E6AE0-E1A5-497D-8F32-F04F0E0072A8}" type="slidenum">
               <a:rPr b="0" lang="en-US" sz="1000" spc="-1" strike="noStrike">
                 <a:latin typeface="arial"/>
               </a:rPr>
@@ -3685,7 +3685,7 @@
               </a:rPr>
               <a:t> / </a:t>
             </a:r>
-            <a:fld id="{FC5B93C3-EA68-4750-B220-002330A7A318}" type="slidecount">
+            <a:fld id="{E3192ACA-BC40-4A37-A747-524EAF4E9CCA}" type="slidecount">
               <a:rPr b="0" lang="en-US" sz="1000" spc="-1" strike="noStrike">
                 <a:latin typeface="arial"/>
               </a:rPr>
@@ -3848,7 +3848,7 @@
               <a:rPr b="0" lang="en-US" sz="1600" spc="-1" strike="noStrike">
                 <a:latin typeface="arial"/>
               </a:rPr>
-              <a:t>Feb 15, 2023 by J. A.</a:t>
+              <a:t>Feb 15, 2023 by J. A. (last updated Feb 24, 2023)</a:t>
             </a:r>
             <a:endParaRPr b="0" lang="en-US" sz="1600" spc="-1" strike="noStrike">
               <a:latin typeface="Noto Sans"/>
@@ -4417,7 +4417,43 @@
                 </a:solidFill>
                 <a:latin typeface="arial"/>
               </a:rPr>
-              <a:t>The upcoming tryCatchLog release will support all major logging frameworks (not only futile.logger): </a:t>
+              <a:t>The upcoming </a:t>
+            </a:r>
+            <a:r>
+              <a:rPr b="0" lang="en-US" sz="1400" spc="-1" strike="noStrike">
+                <a:solidFill>
+                  <a:srgbClr val="333333"/>
+                </a:solidFill>
+                <a:latin typeface="Courier New"/>
+              </a:rPr>
+              <a:t>tryCatchLog</a:t>
+            </a:r>
+            <a:r>
+              <a:rPr b="0" lang="en-US" sz="1400" spc="-1" strike="noStrike">
+                <a:solidFill>
+                  <a:srgbClr val="333333"/>
+                </a:solidFill>
+                <a:latin typeface="arial"/>
+              </a:rPr>
+              <a:t> release will support all major logging frameworks (not only </a:t>
+            </a:r>
+            <a:r>
+              <a:rPr b="0" lang="en-US" sz="1400" spc="-1" strike="noStrike">
+                <a:solidFill>
+                  <a:srgbClr val="333333"/>
+                </a:solidFill>
+                <a:latin typeface="Courier New"/>
+              </a:rPr>
+              <a:t>futile.logger</a:t>
+            </a:r>
+            <a:r>
+              <a:rPr b="0" lang="en-US" sz="1400" spc="-1" strike="noStrike">
+                <a:solidFill>
+                  <a:srgbClr val="333333"/>
+                </a:solidFill>
+                <a:latin typeface="arial"/>
+              </a:rPr>
+              <a:t>): </a:t>
             </a:r>
             <a:r>
               <a:rPr b="0" lang="en-US" sz="1400" spc="-1" strike="noStrike">
@@ -13171,6 +13207,25 @@
                         <a:rPr b="0" lang="en-US" sz="1000" spc="-1" strike="noStrike">
                           <a:latin typeface="arial"/>
                         </a:rPr>
+                        <a:t>Debugging is not possible (e.g. on a production remote machine)</a:t>
+                      </a:r>
+                      <a:endParaRPr b="0" lang="en-US" sz="1000" spc="-1" strike="noStrike">
+                        <a:latin typeface="arial"/>
+                      </a:endParaRPr>
+                    </a:p>
+                    <a:p>
+                      <a:pPr marL="216000" indent="-216000">
+                        <a:buClr>
+                          <a:srgbClr val="000000"/>
+                        </a:buClr>
+                        <a:buSzPct val="45000"/>
+                        <a:buFont typeface="Wingdings" charset="2"/>
+                        <a:buChar char=""/>
+                      </a:pPr>
+                      <a:r>
+                        <a:rPr b="0" lang="en-US" sz="1000" spc="-1" strike="noStrike">
+                          <a:latin typeface="arial"/>
+                        </a:rPr>
                         <a:t>Captures exact code location and call stack of an error</a:t>
                       </a:r>
                       <a:endParaRPr b="0" lang="en-US" sz="1000" spc="-1" strike="noStrike">
@@ -13527,7 +13582,19 @@
                         <a:rPr b="0" lang="en-US" sz="1000" spc="-1" strike="noStrike">
                           <a:latin typeface="arial"/>
                         </a:rPr>
-                        <a:t>input” and “output” env vars are not visible</a:t>
+                        <a:t>input” and “output” variables of the </a:t>
+                      </a:r>
+                      <a:r>
+                        <a:rPr b="0" i="1" lang="en-US" sz="1000" spc="-1" strike="noStrike">
+                          <a:latin typeface="arial"/>
+                        </a:rPr>
+                        <a:t>server()</a:t>
+                      </a:r>
+                      <a:r>
+                        <a:rPr b="0" lang="en-US" sz="1000" spc="-1" strike="noStrike">
+                          <a:latin typeface="arial"/>
+                        </a:rPr>
+                        <a:t> function are not visible (should therefor be stored in a local variable before using it)</a:t>
                       </a:r>
                       <a:endParaRPr b="0" lang="en-US" sz="1000" spc="-1" strike="noStrike">
                         <a:latin typeface="arial"/>
@@ -14682,6 +14749,12 @@
               <a:buChar char=""/>
             </a:pPr>
             <a:r>
+              <a:rPr b="0" i="1" lang="en-US" sz="1200" spc="-1" strike="noStrike">
+                <a:latin typeface="arial"/>
+              </a:rPr>
+              <a:t>Optionally: </a:t>
+            </a:r>
+            <a:r>
               <a:rPr b="1" lang="en-US" sz="1200" spc="-1" strike="noStrike">
                 <a:latin typeface="arial"/>
               </a:rPr>
@@ -14723,7 +14796,31 @@
               <a:rPr b="1" lang="en-US" sz="1200" spc="-1" strike="noStrike">
                 <a:latin typeface="arial"/>
               </a:rPr>
-              <a:t>Store variables of input and output in local variables</a:t>
+              <a:t>Store required </a:t>
+            </a:r>
+            <a:r>
+              <a:rPr b="1" i="1" lang="en-US" sz="1200" spc="-1" strike="noStrike">
+                <a:latin typeface="arial"/>
+              </a:rPr>
+              <a:t>input</a:t>
+            </a:r>
+            <a:r>
+              <a:rPr b="1" lang="en-US" sz="1200" spc="-1" strike="noStrike">
+                <a:latin typeface="arial"/>
+              </a:rPr>
+              <a:t> and </a:t>
+            </a:r>
+            <a:r>
+              <a:rPr b="1" i="1" lang="en-US" sz="1200" spc="-1" strike="noStrike">
+                <a:latin typeface="arial"/>
+              </a:rPr>
+              <a:t>output</a:t>
+            </a:r>
+            <a:r>
+              <a:rPr b="1" lang="en-US" sz="1200" spc="-1" strike="noStrike">
+                <a:latin typeface="arial"/>
+              </a:rPr>
+              <a:t> objects in local variables</a:t>
             </a:r>
             <a:r>
               <a:rPr b="0" lang="en-US" sz="1200" spc="-1" strike="noStrike">
@@ -17975,7 +18072,7 @@
                 </a:solidFill>
                 <a:latin typeface="arial"/>
               </a:rPr>
-              <a:t>It is not easy to reproduce and analyze the problem to fix a bug!</a:t>
+              <a:t>It is not easy to reproduce and analyze a bug to fix it!</a:t>
             </a:r>
             <a:endParaRPr b="0" lang="en-US" sz="1600" spc="-1" strike="noStrike">
               <a:solidFill>

</xml_diff>